<commit_message>
Modified module 9 assignment 2
</commit_message>
<xml_diff>
--- a/module_9_automation_and_configuration_management/module_9_assignment_2_elastic_beanstalk/module_9_assignment_2.pptx
+++ b/module_9_automation_and_configuration_management/module_9_assignment_2_elastic_beanstalk/module_9_assignment_2.pptx
@@ -8,6 +8,7 @@
     <p:sldId id="256" r:id="rId3"/>
     <p:sldId id="257" r:id="rId4"/>
     <p:sldId id="258" r:id="rId5"/>
+    <p:sldId id="259" r:id="rId6"/>
   </p:sldIdLst>
   <p:sldSz cx="10080625" cy="5670550"/>
   <p:notesSz cx="7559675" cy="10691813"/>
@@ -66,7 +67,7 @@
         <p:spPr>
           <a:xfrm>
             <a:off x="504000" y="226080"/>
-            <a:ext cx="9070920" cy="945720"/>
+            <a:ext cx="9072000" cy="946440"/>
           </a:xfrm>
           <a:prstGeom prst="rect">
             <a:avLst/>
@@ -103,7 +104,7 @@
         <p:spPr>
           <a:xfrm>
             <a:off x="504000" y="1326600"/>
-            <a:ext cx="9071640" cy="1568160"/>
+            <a:ext cx="9072000" cy="1568520"/>
           </a:xfrm>
           <a:prstGeom prst="rect">
             <a:avLst/>
@@ -136,8 +137,8 @@
         </p:nvSpPr>
         <p:spPr>
           <a:xfrm>
-            <a:off x="504000" y="3044160"/>
-            <a:ext cx="9071640" cy="1568160"/>
+            <a:off x="504000" y="3044520"/>
+            <a:ext cx="9072000" cy="1568520"/>
           </a:xfrm>
           <a:prstGeom prst="rect">
             <a:avLst/>
@@ -193,7 +194,7 @@
         <p:spPr>
           <a:xfrm>
             <a:off x="504000" y="226080"/>
-            <a:ext cx="9070920" cy="945720"/>
+            <a:ext cx="9072000" cy="946440"/>
           </a:xfrm>
           <a:prstGeom prst="rect">
             <a:avLst/>
@@ -230,7 +231,7 @@
         <p:spPr>
           <a:xfrm>
             <a:off x="504000" y="1326600"/>
-            <a:ext cx="4426920" cy="1568160"/>
+            <a:ext cx="4426920" cy="1568520"/>
           </a:xfrm>
           <a:prstGeom prst="rect">
             <a:avLst/>
@@ -264,7 +265,7 @@
         <p:spPr>
           <a:xfrm>
             <a:off x="5152680" y="1326600"/>
-            <a:ext cx="4426920" cy="1568160"/>
+            <a:ext cx="4426920" cy="1568520"/>
           </a:xfrm>
           <a:prstGeom prst="rect">
             <a:avLst/>
@@ -297,8 +298,8 @@
         </p:nvSpPr>
         <p:spPr>
           <a:xfrm>
-            <a:off x="504000" y="3044160"/>
-            <a:ext cx="4426920" cy="1568160"/>
+            <a:off x="504000" y="3044520"/>
+            <a:ext cx="4426920" cy="1568520"/>
           </a:xfrm>
           <a:prstGeom prst="rect">
             <a:avLst/>
@@ -331,8 +332,8 @@
         </p:nvSpPr>
         <p:spPr>
           <a:xfrm>
-            <a:off x="5152680" y="3044160"/>
-            <a:ext cx="4426920" cy="1568160"/>
+            <a:off x="5152680" y="3044520"/>
+            <a:ext cx="4426920" cy="1568520"/>
           </a:xfrm>
           <a:prstGeom prst="rect">
             <a:avLst/>
@@ -388,7 +389,7 @@
         <p:spPr>
           <a:xfrm>
             <a:off x="504000" y="226080"/>
-            <a:ext cx="9070920" cy="945720"/>
+            <a:ext cx="9072000" cy="946440"/>
           </a:xfrm>
           <a:prstGeom prst="rect">
             <a:avLst/>
@@ -425,7 +426,7 @@
         <p:spPr>
           <a:xfrm>
             <a:off x="504000" y="1326600"/>
-            <a:ext cx="2920680" cy="1568160"/>
+            <a:ext cx="2921040" cy="1568520"/>
           </a:xfrm>
           <a:prstGeom prst="rect">
             <a:avLst/>
@@ -458,8 +459,8 @@
         </p:nvSpPr>
         <p:spPr>
           <a:xfrm>
-            <a:off x="3571200" y="1326600"/>
-            <a:ext cx="2920680" cy="1568160"/>
+            <a:off x="3571560" y="1326600"/>
+            <a:ext cx="2921040" cy="1568520"/>
           </a:xfrm>
           <a:prstGeom prst="rect">
             <a:avLst/>
@@ -492,8 +493,8 @@
         </p:nvSpPr>
         <p:spPr>
           <a:xfrm>
-            <a:off x="6638040" y="1326600"/>
-            <a:ext cx="2920680" cy="1568160"/>
+            <a:off x="6639120" y="1326600"/>
+            <a:ext cx="2921040" cy="1568520"/>
           </a:xfrm>
           <a:prstGeom prst="rect">
             <a:avLst/>
@@ -526,8 +527,8 @@
         </p:nvSpPr>
         <p:spPr>
           <a:xfrm>
-            <a:off x="504000" y="3044160"/>
-            <a:ext cx="2920680" cy="1568160"/>
+            <a:off x="504000" y="3044520"/>
+            <a:ext cx="2921040" cy="1568520"/>
           </a:xfrm>
           <a:prstGeom prst="rect">
             <a:avLst/>
@@ -560,8 +561,8 @@
         </p:nvSpPr>
         <p:spPr>
           <a:xfrm>
-            <a:off x="3571200" y="3044160"/>
-            <a:ext cx="2920680" cy="1568160"/>
+            <a:off x="3571560" y="3044520"/>
+            <a:ext cx="2921040" cy="1568520"/>
           </a:xfrm>
           <a:prstGeom prst="rect">
             <a:avLst/>
@@ -594,8 +595,8 @@
         </p:nvSpPr>
         <p:spPr>
           <a:xfrm>
-            <a:off x="6638040" y="3044160"/>
-            <a:ext cx="2920680" cy="1568160"/>
+            <a:off x="6639120" y="3044520"/>
+            <a:ext cx="2921040" cy="1568520"/>
           </a:xfrm>
           <a:prstGeom prst="rect">
             <a:avLst/>
@@ -651,7 +652,7 @@
         <p:spPr>
           <a:xfrm>
             <a:off x="504000" y="226080"/>
-            <a:ext cx="9070920" cy="945720"/>
+            <a:ext cx="9072000" cy="946440"/>
           </a:xfrm>
           <a:prstGeom prst="rect">
             <a:avLst/>
@@ -688,7 +689,7 @@
         <p:spPr>
           <a:xfrm>
             <a:off x="504000" y="1326600"/>
-            <a:ext cx="9071640" cy="3288240"/>
+            <a:ext cx="9072000" cy="3288600"/>
           </a:xfrm>
           <a:prstGeom prst="rect">
             <a:avLst/>
@@ -747,7 +748,7 @@
         <p:spPr>
           <a:xfrm>
             <a:off x="504000" y="226080"/>
-            <a:ext cx="9070920" cy="945720"/>
+            <a:ext cx="9072000" cy="946440"/>
           </a:xfrm>
           <a:prstGeom prst="rect">
             <a:avLst/>
@@ -784,7 +785,7 @@
         <p:spPr>
           <a:xfrm>
             <a:off x="504000" y="1326600"/>
-            <a:ext cx="9071640" cy="3288240"/>
+            <a:ext cx="9072000" cy="3288600"/>
           </a:xfrm>
           <a:prstGeom prst="rect">
             <a:avLst/>
@@ -840,7 +841,7 @@
         <p:spPr>
           <a:xfrm>
             <a:off x="504000" y="226080"/>
-            <a:ext cx="9070920" cy="945720"/>
+            <a:ext cx="9072000" cy="946440"/>
           </a:xfrm>
           <a:prstGeom prst="rect">
             <a:avLst/>
@@ -877,7 +878,7 @@
         <p:spPr>
           <a:xfrm>
             <a:off x="504000" y="1326600"/>
-            <a:ext cx="4426920" cy="3288240"/>
+            <a:ext cx="4426920" cy="3288600"/>
           </a:xfrm>
           <a:prstGeom prst="rect">
             <a:avLst/>
@@ -911,7 +912,7 @@
         <p:spPr>
           <a:xfrm>
             <a:off x="5152680" y="1326600"/>
-            <a:ext cx="4426920" cy="3288240"/>
+            <a:ext cx="4426920" cy="3288600"/>
           </a:xfrm>
           <a:prstGeom prst="rect">
             <a:avLst/>
@@ -967,7 +968,7 @@
         <p:spPr>
           <a:xfrm>
             <a:off x="504000" y="226080"/>
-            <a:ext cx="9070920" cy="945720"/>
+            <a:ext cx="9072000" cy="946440"/>
           </a:xfrm>
           <a:prstGeom prst="rect">
             <a:avLst/>
@@ -1026,7 +1027,7 @@
         <p:spPr>
           <a:xfrm>
             <a:off x="504000" y="226080"/>
-            <a:ext cx="9070920" cy="4385160"/>
+            <a:ext cx="9072000" cy="4388400"/>
           </a:xfrm>
           <a:prstGeom prst="rect">
             <a:avLst/>
@@ -1085,7 +1086,7 @@
         <p:spPr>
           <a:xfrm>
             <a:off x="504000" y="226080"/>
-            <a:ext cx="9070920" cy="945720"/>
+            <a:ext cx="9072000" cy="946440"/>
           </a:xfrm>
           <a:prstGeom prst="rect">
             <a:avLst/>
@@ -1122,7 +1123,7 @@
         <p:spPr>
           <a:xfrm>
             <a:off x="504000" y="1326600"/>
-            <a:ext cx="4426920" cy="1568160"/>
+            <a:ext cx="4426920" cy="1568520"/>
           </a:xfrm>
           <a:prstGeom prst="rect">
             <a:avLst/>
@@ -1156,7 +1157,7 @@
         <p:spPr>
           <a:xfrm>
             <a:off x="5152680" y="1326600"/>
-            <a:ext cx="4426920" cy="3288240"/>
+            <a:ext cx="4426920" cy="3288600"/>
           </a:xfrm>
           <a:prstGeom prst="rect">
             <a:avLst/>
@@ -1189,8 +1190,8 @@
         </p:nvSpPr>
         <p:spPr>
           <a:xfrm>
-            <a:off x="504000" y="3044160"/>
-            <a:ext cx="4426920" cy="1568160"/>
+            <a:off x="504000" y="3044520"/>
+            <a:ext cx="4426920" cy="1568520"/>
           </a:xfrm>
           <a:prstGeom prst="rect">
             <a:avLst/>
@@ -1246,7 +1247,7 @@
         <p:spPr>
           <a:xfrm>
             <a:off x="504000" y="226080"/>
-            <a:ext cx="9070920" cy="945720"/>
+            <a:ext cx="9072000" cy="946440"/>
           </a:xfrm>
           <a:prstGeom prst="rect">
             <a:avLst/>
@@ -1283,7 +1284,7 @@
         <p:spPr>
           <a:xfrm>
             <a:off x="504000" y="1326600"/>
-            <a:ext cx="4426920" cy="3288240"/>
+            <a:ext cx="4426920" cy="3288600"/>
           </a:xfrm>
           <a:prstGeom prst="rect">
             <a:avLst/>
@@ -1317,7 +1318,7 @@
         <p:spPr>
           <a:xfrm>
             <a:off x="5152680" y="1326600"/>
-            <a:ext cx="4426920" cy="1568160"/>
+            <a:ext cx="4426920" cy="1568520"/>
           </a:xfrm>
           <a:prstGeom prst="rect">
             <a:avLst/>
@@ -1350,8 +1351,8 @@
         </p:nvSpPr>
         <p:spPr>
           <a:xfrm>
-            <a:off x="5152680" y="3044160"/>
-            <a:ext cx="4426920" cy="1568160"/>
+            <a:off x="5152680" y="3044520"/>
+            <a:ext cx="4426920" cy="1568520"/>
           </a:xfrm>
           <a:prstGeom prst="rect">
             <a:avLst/>
@@ -1407,7 +1408,7 @@
         <p:spPr>
           <a:xfrm>
             <a:off x="504000" y="226080"/>
-            <a:ext cx="9070920" cy="945720"/>
+            <a:ext cx="9072000" cy="946440"/>
           </a:xfrm>
           <a:prstGeom prst="rect">
             <a:avLst/>
@@ -1444,7 +1445,7 @@
         <p:spPr>
           <a:xfrm>
             <a:off x="504000" y="1326600"/>
-            <a:ext cx="4426920" cy="1568160"/>
+            <a:ext cx="4426920" cy="1568520"/>
           </a:xfrm>
           <a:prstGeom prst="rect">
             <a:avLst/>
@@ -1478,7 +1479,7 @@
         <p:spPr>
           <a:xfrm>
             <a:off x="5152680" y="1326600"/>
-            <a:ext cx="4426920" cy="1568160"/>
+            <a:ext cx="4426920" cy="1568520"/>
           </a:xfrm>
           <a:prstGeom prst="rect">
             <a:avLst/>
@@ -1511,8 +1512,8 @@
         </p:nvSpPr>
         <p:spPr>
           <a:xfrm>
-            <a:off x="504000" y="3044160"/>
-            <a:ext cx="9071640" cy="1568160"/>
+            <a:off x="504000" y="3044520"/>
+            <a:ext cx="9072000" cy="1568520"/>
           </a:xfrm>
           <a:prstGeom prst="rect">
             <a:avLst/>
@@ -1568,7 +1569,7 @@
         <p:spPr>
           <a:xfrm>
             <a:off x="504000" y="226080"/>
-            <a:ext cx="9070920" cy="945720"/>
+            <a:ext cx="9072000" cy="946440"/>
           </a:xfrm>
           <a:prstGeom prst="rect">
             <a:avLst/>
@@ -1583,115 +1584,22 @@
             <a:noAutofit/>
           </a:bodyPr>
           <a:p>
-            <a:r>
-              <a:rPr b="0" lang="en-IN" sz="1800" spc="-1" strike="noStrike">
-                <a:latin typeface="Arial"/>
-              </a:rPr>
-              <a:t>C</a:t>
-            </a:r>
-            <a:r>
-              <a:rPr b="0" lang="en-IN" sz="1800" spc="-1" strike="noStrike">
-                <a:latin typeface="Arial"/>
-              </a:rPr>
-              <a:t>li</a:t>
-            </a:r>
-            <a:r>
-              <a:rPr b="0" lang="en-IN" sz="1800" spc="-1" strike="noStrike">
-                <a:latin typeface="Arial"/>
-              </a:rPr>
-              <a:t>c</a:t>
-            </a:r>
-            <a:r>
-              <a:rPr b="0" lang="en-IN" sz="1800" spc="-1" strike="noStrike">
-                <a:latin typeface="Arial"/>
-              </a:rPr>
-              <a:t>k </a:t>
-            </a:r>
-            <a:r>
-              <a:rPr b="0" lang="en-IN" sz="1800" spc="-1" strike="noStrike">
-                <a:latin typeface="Arial"/>
-              </a:rPr>
-              <a:t>to </a:t>
-            </a:r>
-            <a:r>
-              <a:rPr b="0" lang="en-IN" sz="1800" spc="-1" strike="noStrike">
-                <a:latin typeface="Arial"/>
-              </a:rPr>
-              <a:t>e</a:t>
-            </a:r>
-            <a:r>
-              <a:rPr b="0" lang="en-IN" sz="1800" spc="-1" strike="noStrike">
-                <a:latin typeface="Arial"/>
-              </a:rPr>
-              <a:t>di</a:t>
-            </a:r>
-            <a:r>
-              <a:rPr b="0" lang="en-IN" sz="1800" spc="-1" strike="noStrike">
-                <a:latin typeface="Arial"/>
-              </a:rPr>
-              <a:t>t </a:t>
-            </a:r>
-            <a:r>
-              <a:rPr b="0" lang="en-IN" sz="1800" spc="-1" strike="noStrike">
-                <a:latin typeface="Arial"/>
-              </a:rPr>
-              <a:t>th</a:t>
-            </a:r>
-            <a:r>
-              <a:rPr b="0" lang="en-IN" sz="1800" spc="-1" strike="noStrike">
-                <a:latin typeface="Arial"/>
-              </a:rPr>
-              <a:t>e </a:t>
-            </a:r>
-            <a:r>
-              <a:rPr b="0" lang="en-IN" sz="1800" spc="-1" strike="noStrike">
-                <a:latin typeface="Arial"/>
-              </a:rPr>
-              <a:t>tit</a:t>
-            </a:r>
-            <a:r>
-              <a:rPr b="0" lang="en-IN" sz="1800" spc="-1" strike="noStrike">
-                <a:latin typeface="Arial"/>
-              </a:rPr>
-              <a:t>le </a:t>
-            </a:r>
-            <a:r>
-              <a:rPr b="0" lang="en-IN" sz="1800" spc="-1" strike="noStrike">
-                <a:latin typeface="Arial"/>
-              </a:rPr>
-              <a:t>te</a:t>
-            </a:r>
-            <a:r>
-              <a:rPr b="0" lang="en-IN" sz="1800" spc="-1" strike="noStrike">
-                <a:latin typeface="Arial"/>
-              </a:rPr>
-              <a:t>xt </a:t>
-            </a:r>
-            <a:r>
-              <a:rPr b="0" lang="en-IN" sz="1800" spc="-1" strike="noStrike">
-                <a:latin typeface="Arial"/>
-              </a:rPr>
-              <a:t>fo</a:t>
-            </a:r>
-            <a:r>
-              <a:rPr b="0" lang="en-IN" sz="1800" spc="-1" strike="noStrike">
-                <a:latin typeface="Arial"/>
-              </a:rPr>
-              <a:t>r</a:t>
-            </a:r>
-            <a:r>
-              <a:rPr b="0" lang="en-IN" sz="1800" spc="-1" strike="noStrike">
-                <a:latin typeface="Arial"/>
-              </a:rPr>
-              <a:t>m</a:t>
-            </a:r>
-            <a:r>
-              <a:rPr b="0" lang="en-IN" sz="1800" spc="-1" strike="noStrike">
-                <a:latin typeface="Arial"/>
-              </a:rPr>
-              <a:t>at</a:t>
-            </a:r>
-            <a:endParaRPr b="0" lang="en-IN" sz="1800" spc="-1" strike="noStrike">
+            <a:pPr algn="ctr">
+              <a:buNone/>
+            </a:pPr>
+            <a:r>
+              <a:rPr b="0" lang="en-IN" sz="4400" spc="-1" strike="noStrike">
+                <a:latin typeface="Arial"/>
+              </a:rPr>
+              <a:t>Click to edit the </a:t>
+            </a:r>
+            <a:r>
+              <a:rPr b="0" lang="en-IN" sz="4400" spc="-1" strike="noStrike">
+                <a:latin typeface="Arial"/>
+              </a:rPr>
+              <a:t>title text format</a:t>
+            </a:r>
+            <a:endParaRPr b="0" lang="en-IN" sz="4400" spc="-1" strike="noStrike">
               <a:latin typeface="Arial"/>
             </a:endParaRPr>
           </a:p>
@@ -1710,7 +1618,7 @@
         <p:spPr>
           <a:xfrm>
             <a:off x="504000" y="1326600"/>
-            <a:ext cx="9071640" cy="3288240"/>
+            <a:ext cx="9072000" cy="3288600"/>
           </a:xfrm>
           <a:prstGeom prst="rect">
             <a:avLst/>
@@ -1737,12 +1645,12 @@
               <a:buChar char=""/>
             </a:pPr>
             <a:r>
-              <a:rPr b="0" lang="en-IN" sz="1800" spc="-1" strike="noStrike">
+              <a:rPr b="0" lang="en-IN" sz="3200" spc="-1" strike="noStrike">
                 <a:latin typeface="Arial"/>
               </a:rPr>
               <a:t>Click to edit the outline text format</a:t>
             </a:r>
-            <a:endParaRPr b="0" lang="en-IN" sz="1800" spc="-1" strike="noStrike">
+            <a:endParaRPr b="0" lang="en-IN" sz="3200" spc="-1" strike="noStrike">
               <a:latin typeface="Arial"/>
             </a:endParaRPr>
           </a:p>
@@ -1759,12 +1667,12 @@
               <a:buChar char=""/>
             </a:pPr>
             <a:r>
-              <a:rPr b="0" lang="en-IN" sz="1800" spc="-1" strike="noStrike">
+              <a:rPr b="0" lang="en-IN" sz="2800" spc="-1" strike="noStrike">
                 <a:latin typeface="Arial"/>
               </a:rPr>
               <a:t>Second Outline Level</a:t>
             </a:r>
-            <a:endParaRPr b="0" lang="en-IN" sz="1800" spc="-1" strike="noStrike">
+            <a:endParaRPr b="0" lang="en-IN" sz="2800" spc="-1" strike="noStrike">
               <a:latin typeface="Arial"/>
             </a:endParaRPr>
           </a:p>
@@ -1781,12 +1689,12 @@
               <a:buChar char=""/>
             </a:pPr>
             <a:r>
-              <a:rPr b="0" lang="en-IN" sz="1800" spc="-1" strike="noStrike">
+              <a:rPr b="0" lang="en-IN" sz="2400" spc="-1" strike="noStrike">
                 <a:latin typeface="Arial"/>
               </a:rPr>
               <a:t>Third Outline Level</a:t>
             </a:r>
-            <a:endParaRPr b="0" lang="en-IN" sz="1800" spc="-1" strike="noStrike">
+            <a:endParaRPr b="0" lang="en-IN" sz="2400" spc="-1" strike="noStrike">
               <a:latin typeface="Arial"/>
             </a:endParaRPr>
           </a:p>
@@ -1803,12 +1711,12 @@
               <a:buChar char=""/>
             </a:pPr>
             <a:r>
-              <a:rPr b="0" lang="en-IN" sz="1800" spc="-1" strike="noStrike">
+              <a:rPr b="0" lang="en-IN" sz="2000" spc="-1" strike="noStrike">
                 <a:latin typeface="Arial"/>
               </a:rPr>
               <a:t>Fourth Outline Level</a:t>
             </a:r>
-            <a:endParaRPr b="0" lang="en-IN" sz="1800" spc="-1" strike="noStrike">
+            <a:endParaRPr b="0" lang="en-IN" sz="2000" spc="-1" strike="noStrike">
               <a:latin typeface="Arial"/>
             </a:endParaRPr>
           </a:p>
@@ -1825,12 +1733,12 @@
               <a:buChar char=""/>
             </a:pPr>
             <a:r>
-              <a:rPr b="0" lang="en-IN" sz="1800" spc="-1" strike="noStrike">
+              <a:rPr b="0" lang="en-IN" sz="2000" spc="-1" strike="noStrike">
                 <a:latin typeface="Arial"/>
               </a:rPr>
               <a:t>Fifth Outline Level</a:t>
             </a:r>
-            <a:endParaRPr b="0" lang="en-IN" sz="1800" spc="-1" strike="noStrike">
+            <a:endParaRPr b="0" lang="en-IN" sz="2000" spc="-1" strike="noStrike">
               <a:latin typeface="Arial"/>
             </a:endParaRPr>
           </a:p>
@@ -1847,12 +1755,12 @@
               <a:buChar char=""/>
             </a:pPr>
             <a:r>
-              <a:rPr b="0" lang="en-IN" sz="1800" spc="-1" strike="noStrike">
+              <a:rPr b="0" lang="en-IN" sz="2000" spc="-1" strike="noStrike">
                 <a:latin typeface="Arial"/>
               </a:rPr>
               <a:t>Sixth Outline Level</a:t>
             </a:r>
-            <a:endParaRPr b="0" lang="en-IN" sz="1800" spc="-1" strike="noStrike">
+            <a:endParaRPr b="0" lang="en-IN" sz="2000" spc="-1" strike="noStrike">
               <a:latin typeface="Arial"/>
             </a:endParaRPr>
           </a:p>
@@ -1869,12 +1777,12 @@
               <a:buChar char=""/>
             </a:pPr>
             <a:r>
-              <a:rPr b="0" lang="en-IN" sz="1800" spc="-1" strike="noStrike">
+              <a:rPr b="0" lang="en-IN" sz="2000" spc="-1" strike="noStrike">
                 <a:latin typeface="Arial"/>
               </a:rPr>
               <a:t>Seventh Outline Level</a:t>
             </a:r>
-            <a:endParaRPr b="0" lang="en-IN" sz="1800" spc="-1" strike="noStrike">
+            <a:endParaRPr b="0" lang="en-IN" sz="2000" spc="-1" strike="noStrike">
               <a:latin typeface="Arial"/>
             </a:endParaRPr>
           </a:p>
@@ -1930,7 +1838,7 @@
         <p:spPr>
           <a:xfrm>
             <a:off x="504000" y="226080"/>
-            <a:ext cx="9070920" cy="945720"/>
+            <a:ext cx="9070560" cy="945360"/>
           </a:xfrm>
           <a:prstGeom prst="rect">
             <a:avLst/>
@@ -2351,7 +2259,7 @@
         <p:spPr>
           <a:xfrm>
             <a:off x="504000" y="1326600"/>
-            <a:ext cx="9070920" cy="3287520"/>
+            <a:ext cx="9070560" cy="3287160"/>
           </a:xfrm>
           <a:prstGeom prst="rect">
             <a:avLst/>
@@ -3395,7 +3303,7 @@
         <p:spPr>
           <a:xfrm>
             <a:off x="7471080" y="0"/>
-            <a:ext cx="2609640" cy="1161720"/>
+            <a:ext cx="2609280" cy="1161360"/>
           </a:xfrm>
           <a:prstGeom prst="rect">
             <a:avLst/>
@@ -3420,7 +3328,7 @@
         <p:spPr>
           <a:xfrm>
             <a:off x="0" y="3909240"/>
-            <a:ext cx="4140000" cy="1761120"/>
+            <a:ext cx="4139640" cy="1760760"/>
           </a:xfrm>
           <a:prstGeom prst="rect">
             <a:avLst/>
@@ -3445,7 +3353,7 @@
         <p:spPr>
           <a:xfrm>
             <a:off x="0" y="1980000"/>
-            <a:ext cx="5580000" cy="1853640"/>
+            <a:ext cx="5579640" cy="1853280"/>
           </a:xfrm>
           <a:prstGeom prst="rect">
             <a:avLst/>
@@ -3470,7 +3378,7 @@
         <p:spPr>
           <a:xfrm>
             <a:off x="4062240" y="0"/>
-            <a:ext cx="2921760" cy="1080000"/>
+            <a:ext cx="2921400" cy="1079640"/>
           </a:xfrm>
           <a:prstGeom prst="rect">
             <a:avLst/>
@@ -3496,7 +3404,7 @@
         <p:spPr>
           <a:xfrm>
             <a:off x="0" y="-1800"/>
-            <a:ext cx="3960000" cy="1856520"/>
+            <a:ext cx="3959640" cy="1856160"/>
           </a:xfrm>
           <a:prstGeom prst="rect">
             <a:avLst/>
@@ -3517,7 +3425,7 @@
         <p:spPr>
           <a:xfrm>
             <a:off x="2916000" y="684000"/>
-            <a:ext cx="539640" cy="539640"/>
+            <a:ext cx="539280" cy="539280"/>
           </a:xfrm>
           <a:prstGeom prst="ellipse">
             <a:avLst/>
@@ -3573,7 +3481,7 @@
         <p:spPr>
           <a:xfrm>
             <a:off x="6408000" y="468000"/>
-            <a:ext cx="539640" cy="539640"/>
+            <a:ext cx="539280" cy="539280"/>
           </a:xfrm>
           <a:prstGeom prst="ellipse">
             <a:avLst/>
@@ -3629,7 +3537,7 @@
         <p:spPr>
           <a:xfrm>
             <a:off x="5940000" y="3600000"/>
-            <a:ext cx="4140360" cy="2070360"/>
+            <a:ext cx="4140000" cy="2070000"/>
           </a:xfrm>
           <a:prstGeom prst="rect">
             <a:avLst/>
@@ -3790,7 +3698,7 @@
         <p:spPr>
           <a:xfrm>
             <a:off x="4140000" y="2520000"/>
-            <a:ext cx="539640" cy="539640"/>
+            <a:ext cx="539280" cy="539280"/>
           </a:xfrm>
           <a:prstGeom prst="ellipse">
             <a:avLst/>
@@ -3846,7 +3754,7 @@
         <p:spPr>
           <a:xfrm>
             <a:off x="2340360" y="4320000"/>
-            <a:ext cx="539640" cy="539640"/>
+            <a:ext cx="539280" cy="539280"/>
           </a:xfrm>
           <a:prstGeom prst="ellipse">
             <a:avLst/>
@@ -3902,7 +3810,7 @@
         <p:spPr>
           <a:xfrm>
             <a:off x="9180360" y="180360"/>
-            <a:ext cx="539640" cy="539640"/>
+            <a:ext cx="539280" cy="539280"/>
           </a:xfrm>
           <a:prstGeom prst="ellipse">
             <a:avLst/>
@@ -3958,7 +3866,7 @@
         <p:spPr>
           <a:xfrm>
             <a:off x="9324360" y="1656360"/>
-            <a:ext cx="539640" cy="539640"/>
+            <a:ext cx="539280" cy="539280"/>
           </a:xfrm>
           <a:prstGeom prst="ellipse">
             <a:avLst/>
@@ -4018,7 +3926,7 @@
         <p:spPr>
           <a:xfrm>
             <a:off x="8490240" y="1325160"/>
-            <a:ext cx="1590480" cy="294840"/>
+            <a:ext cx="1590120" cy="294480"/>
           </a:xfrm>
           <a:prstGeom prst="rect">
             <a:avLst/>
@@ -4073,7 +3981,7 @@
         <p:spPr>
           <a:xfrm>
             <a:off x="0" y="-20520"/>
-            <a:ext cx="7020000" cy="3399120"/>
+            <a:ext cx="7019640" cy="3398760"/>
           </a:xfrm>
           <a:prstGeom prst="rect">
             <a:avLst/>
@@ -4094,7 +4002,7 @@
         <p:spPr>
           <a:xfrm>
             <a:off x="5940000" y="3600000"/>
-            <a:ext cx="4140360" cy="2070360"/>
+            <a:ext cx="4140000" cy="2070000"/>
           </a:xfrm>
           <a:prstGeom prst="rect">
             <a:avLst/>
@@ -4133,7 +4041,7 @@
                 <a:latin typeface="Arial"/>
                 <a:ea typeface="DejaVu Sans"/>
               </a:rPr>
-              <a:t>7. Wait until the app environment is fully created. Click on “Upload and deploy”</a:t>
+              <a:t>7. Wait until the app environment is fully created. Click on “Upload and deploy”. Verify that app is loaded properly in the browser (see next slide for output)</a:t>
             </a:r>
             <a:endParaRPr b="0" lang="en-IN" sz="1200" spc="-1" strike="noStrike">
               <a:latin typeface="Arial"/>
@@ -4192,7 +4100,7 @@
         <p:spPr>
           <a:xfrm>
             <a:off x="4320360" y="648360"/>
-            <a:ext cx="539640" cy="539640"/>
+            <a:ext cx="539280" cy="539280"/>
           </a:xfrm>
           <a:prstGeom prst="ellipse">
             <a:avLst/>
@@ -4252,7 +4160,7 @@
         <p:spPr>
           <a:xfrm>
             <a:off x="0" y="3600000"/>
-            <a:ext cx="5714640" cy="523440"/>
+            <a:ext cx="5714280" cy="523080"/>
           </a:xfrm>
           <a:prstGeom prst="rect">
             <a:avLst/>
@@ -4271,7 +4179,7 @@
         <p:spPr>
           <a:xfrm>
             <a:off x="0" y="4140360"/>
-            <a:ext cx="539640" cy="539640"/>
+            <a:ext cx="539280" cy="539280"/>
           </a:xfrm>
           <a:prstGeom prst="ellipse">
             <a:avLst/>
@@ -4331,7 +4239,7 @@
         <p:spPr>
           <a:xfrm>
             <a:off x="7182360" y="0"/>
-            <a:ext cx="2906640" cy="1620000"/>
+            <a:ext cx="2906280" cy="1619640"/>
           </a:xfrm>
           <a:prstGeom prst="rect">
             <a:avLst/>
@@ -4352,7 +4260,7 @@
         <p:spPr>
           <a:xfrm>
             <a:off x="9360000" y="1800000"/>
-            <a:ext cx="539640" cy="539640"/>
+            <a:ext cx="539280" cy="539280"/>
           </a:xfrm>
           <a:prstGeom prst="ellipse">
             <a:avLst/>
@@ -4399,6 +4307,59 @@
           </a:p>
         </p:txBody>
       </p:sp>
+    </p:spTree>
+  </p:cSld>
+  <mc:AlternateContent>
+    <mc:Choice Requires="p14">
+      <p:transition spd="slow" p14:dur="2000"/>
+    </mc:Choice>
+    <mc:Fallback>
+      <p:transition spd="slow"/>
+    </mc:Fallback>
+  </mc:AlternateContent>
+</p:sld>
+</file>
+
+<file path=ppt/slides/slide4.xml><?xml version="1.0" encoding="utf-8"?>
+<p:sld xmlns:a="http://schemas.openxmlformats.org/drawingml/2006/main" xmlns:p="http://schemas.openxmlformats.org/presentationml/2006/main" xmlns:r="http://schemas.openxmlformats.org/officeDocument/2006/relationships" xmlns:p14="http://schemas.microsoft.com/office/powerpoint/2010/main" xmlns:p15="http://schemas.microsoft.com/office/powerpoint/2012/main" xmlns:mc="http://schemas.openxmlformats.org/markup-compatibility/2006">
+  <p:cSld>
+    <p:spTree>
+      <p:nvGrpSpPr>
+        <p:cNvPr id="1" name=""/>
+        <p:cNvGrpSpPr/>
+        <p:nvPr/>
+      </p:nvGrpSpPr>
+      <p:grpSpPr>
+        <a:xfrm>
+          <a:off x="0" y="0"/>
+          <a:ext cx="0" cy="0"/>
+          <a:chOff x="0" y="0"/>
+          <a:chExt cx="0" cy="0"/>
+        </a:xfrm>
+      </p:grpSpPr>
+      <p:pic>
+        <p:nvPicPr>
+          <p:cNvPr id="60" name="" descr=""/>
+          <p:cNvPicPr/>
+          <p:nvPr/>
+        </p:nvPicPr>
+        <p:blipFill>
+          <a:blip r:embed="rId1"/>
+          <a:stretch/>
+        </p:blipFill>
+        <p:spPr>
+          <a:xfrm>
+            <a:off x="28800" y="121680"/>
+            <a:ext cx="10080360" cy="5455080"/>
+          </a:xfrm>
+          <a:prstGeom prst="rect">
+            <a:avLst/>
+          </a:prstGeom>
+          <a:ln w="0">
+            <a:noFill/>
+          </a:ln>
+        </p:spPr>
+      </p:pic>
     </p:spTree>
   </p:cSld>
   <mc:AlternateContent>

</xml_diff>